<commit_message>
minor improvements to a couple of PowerPoint slides
</commit_message>
<xml_diff>
--- a/PowerPoints/05 - Lexical Analysis.pptx
+++ b/PowerPoints/05 - Lexical Analysis.pptx
@@ -9354,8 +9354,8 @@
         </p:nvCxnSpPr>
         <p:spPr bwMode="auto">
           <a:xfrm>
-            <a:off x="4571673" y="4268865"/>
-            <a:ext cx="791" cy="423776"/>
+            <a:off x="4571673" y="4238087"/>
+            <a:ext cx="791" cy="454554"/>
           </a:xfrm>
           <a:prstGeom prst="straightConnector1">
             <a:avLst/>
@@ -9381,8 +9381,8 @@
         </p:nvSpPr>
         <p:spPr bwMode="auto">
           <a:xfrm>
-            <a:off x="109714" y="3898891"/>
-            <a:ext cx="8923918" cy="369974"/>
+            <a:off x="607447" y="3898891"/>
+            <a:ext cx="7928452" cy="339196"/>
           </a:xfrm>
           <a:prstGeom prst="rect">
             <a:avLst/>
@@ -9402,7 +9402,7 @@
           <a:lstStyle/>
           <a:p>
             <a:r>
-              <a:rPr lang="en-US" sz="1800" dirty="0">
+              <a:rPr lang="en-US" sz="1600" dirty="0">
                 <a:latin typeface="Consolas" pitchFamily="49" charset="0"/>
               </a:rPr>
               <a:t>'y'   ' '   ':'   '='   ' '   'x'   ' '   '+'   ' '   '1'   '0'   '0'</a:t>
@@ -9439,248 +9439,6 @@
           </a:ln>
         </p:spPr>
       </p:cxnSp>
-      <p:grpSp>
-        <p:nvGrpSpPr>
-          <p:cNvPr id="7" name="Group 6"/>
-          <p:cNvGrpSpPr/>
-          <p:nvPr/>
-        </p:nvGrpSpPr>
-        <p:grpSpPr>
-          <a:xfrm>
-            <a:off x="196941" y="5649912"/>
-            <a:ext cx="8750118" cy="369974"/>
-            <a:chOff x="228600" y="5649912"/>
-            <a:chExt cx="8750118" cy="369974"/>
-          </a:xfrm>
-        </p:grpSpPr>
-        <p:sp>
-          <p:nvSpPr>
-            <p:cNvPr id="10254" name="Text Box 9"/>
-            <p:cNvSpPr txBox="1">
-              <a:spLocks noChangeArrowheads="1"/>
-            </p:cNvSpPr>
-            <p:nvPr/>
-          </p:nvSpPr>
-          <p:spPr bwMode="auto">
-            <a:xfrm>
-              <a:off x="228600" y="5649912"/>
-              <a:ext cx="2197718" cy="369974"/>
-            </a:xfrm>
-            <a:prstGeom prst="rect">
-              <a:avLst/>
-            </a:prstGeom>
-            <a:noFill/>
-            <a:ln w="9525">
-              <a:noFill/>
-              <a:miter lim="800000"/>
-              <a:headEnd/>
-              <a:tailEnd/>
-            </a:ln>
-          </p:spPr>
-          <p:txBody>
-            <a:bodyPr wrap="none" lIns="92075" tIns="46038" rIns="92075" bIns="46038">
-              <a:spAutoFit/>
-            </a:bodyPr>
-            <a:lstStyle/>
-            <a:p>
-              <a:r>
-                <a:rPr lang="en-US" sz="1800" dirty="0"/>
-                <a:t>identifier [“</a:t>
-              </a:r>
-              <a:r>
-                <a:rPr lang="en-US" sz="1800" dirty="0">
-                  <a:latin typeface="Consolas" pitchFamily="49" charset="0"/>
-                </a:rPr>
-                <a:t>y</a:t>
-              </a:r>
-              <a:r>
-                <a:rPr lang="en-US" sz="1800" dirty="0"/>
-                <a:t>”, (1, 1)]</a:t>
-              </a:r>
-            </a:p>
-          </p:txBody>
-        </p:sp>
-        <p:sp>
-          <p:nvSpPr>
-            <p:cNvPr id="10255" name="Text Box 10"/>
-            <p:cNvSpPr txBox="1">
-              <a:spLocks noChangeArrowheads="1"/>
-            </p:cNvSpPr>
-            <p:nvPr/>
-          </p:nvSpPr>
-          <p:spPr bwMode="auto">
-            <a:xfrm>
-              <a:off x="2470892" y="5649955"/>
-              <a:ext cx="1169988" cy="369888"/>
-            </a:xfrm>
-            <a:prstGeom prst="rect">
-              <a:avLst/>
-            </a:prstGeom>
-            <a:noFill/>
-            <a:ln w="9525">
-              <a:noFill/>
-              <a:miter lim="800000"/>
-              <a:headEnd/>
-              <a:tailEnd/>
-            </a:ln>
-          </p:spPr>
-          <p:txBody>
-            <a:bodyPr wrap="none" lIns="92075" tIns="46038" rIns="92075" bIns="46038">
-              <a:spAutoFit/>
-            </a:bodyPr>
-            <a:lstStyle/>
-            <a:p>
-              <a:r>
-                <a:rPr lang="en-US" sz="1800" dirty="0">
-                  <a:latin typeface="Consolas" pitchFamily="49" charset="0"/>
-                </a:rPr>
-                <a:t>:=</a:t>
-              </a:r>
-              <a:r>
-                <a:rPr lang="en-US" sz="1800" dirty="0"/>
-                <a:t> [(1, 3)]</a:t>
-              </a:r>
-            </a:p>
-          </p:txBody>
-        </p:sp>
-        <p:sp>
-          <p:nvSpPr>
-            <p:cNvPr id="10256" name="Text Box 11"/>
-            <p:cNvSpPr txBox="1">
-              <a:spLocks noChangeArrowheads="1"/>
-            </p:cNvSpPr>
-            <p:nvPr/>
-          </p:nvSpPr>
-          <p:spPr bwMode="auto">
-            <a:xfrm>
-              <a:off x="3685454" y="5649955"/>
-              <a:ext cx="1504951" cy="369888"/>
-            </a:xfrm>
-            <a:prstGeom prst="rect">
-              <a:avLst/>
-            </a:prstGeom>
-            <a:noFill/>
-            <a:ln w="9525">
-              <a:noFill/>
-              <a:miter lim="800000"/>
-              <a:headEnd/>
-              <a:tailEnd/>
-            </a:ln>
-          </p:spPr>
-          <p:txBody>
-            <a:bodyPr wrap="none" lIns="92075" tIns="46038" rIns="92075" bIns="46038">
-              <a:spAutoFit/>
-            </a:bodyPr>
-            <a:lstStyle/>
-            <a:p>
-              <a:r>
-                <a:rPr lang="en-US" sz="1800" dirty="0"/>
-                <a:t>id [“</a:t>
-              </a:r>
-              <a:r>
-                <a:rPr lang="en-US" sz="1800" dirty="0">
-                  <a:latin typeface="Consolas" pitchFamily="49" charset="0"/>
-                </a:rPr>
-                <a:t>x</a:t>
-              </a:r>
-              <a:r>
-                <a:rPr lang="en-US" sz="1800" dirty="0"/>
-                <a:t>”, (1, 6)]</a:t>
-              </a:r>
-            </a:p>
-          </p:txBody>
-        </p:sp>
-        <p:sp>
-          <p:nvSpPr>
-            <p:cNvPr id="10257" name="Text Box 12"/>
-            <p:cNvSpPr txBox="1">
-              <a:spLocks noChangeArrowheads="1"/>
-            </p:cNvSpPr>
-            <p:nvPr/>
-          </p:nvSpPr>
-          <p:spPr bwMode="auto">
-            <a:xfrm>
-              <a:off x="5234979" y="5649955"/>
-              <a:ext cx="1042988" cy="369888"/>
-            </a:xfrm>
-            <a:prstGeom prst="rect">
-              <a:avLst/>
-            </a:prstGeom>
-            <a:noFill/>
-            <a:ln w="9525">
-              <a:noFill/>
-              <a:miter lim="800000"/>
-              <a:headEnd/>
-              <a:tailEnd/>
-            </a:ln>
-          </p:spPr>
-          <p:txBody>
-            <a:bodyPr wrap="none" lIns="92075" tIns="46038" rIns="92075" bIns="46038">
-              <a:spAutoFit/>
-            </a:bodyPr>
-            <a:lstStyle/>
-            <a:p>
-              <a:r>
-                <a:rPr lang="en-US" sz="1800" dirty="0">
-                  <a:latin typeface="Consolas" pitchFamily="49" charset="0"/>
-                </a:rPr>
-                <a:t>+</a:t>
-              </a:r>
-              <a:r>
-                <a:rPr lang="en-US" sz="1800" dirty="0"/>
-                <a:t> [(1, 8)]</a:t>
-              </a:r>
-            </a:p>
-          </p:txBody>
-        </p:sp>
-        <p:sp>
-          <p:nvSpPr>
-            <p:cNvPr id="10258" name="Text Box 13"/>
-            <p:cNvSpPr txBox="1">
-              <a:spLocks noChangeArrowheads="1"/>
-            </p:cNvSpPr>
-            <p:nvPr/>
-          </p:nvSpPr>
-          <p:spPr bwMode="auto">
-            <a:xfrm>
-              <a:off x="6322542" y="5649912"/>
-              <a:ext cx="2656176" cy="369974"/>
-            </a:xfrm>
-            <a:prstGeom prst="rect">
-              <a:avLst/>
-            </a:prstGeom>
-            <a:noFill/>
-            <a:ln w="9525">
-              <a:noFill/>
-              <a:miter lim="800000"/>
-              <a:headEnd/>
-              <a:tailEnd/>
-            </a:ln>
-          </p:spPr>
-          <p:txBody>
-            <a:bodyPr wrap="none" lIns="92075" tIns="46038" rIns="92075" bIns="46038">
-              <a:spAutoFit/>
-            </a:bodyPr>
-            <a:lstStyle/>
-            <a:p>
-              <a:r>
-                <a:rPr lang="en-US" sz="1800" dirty="0"/>
-                <a:t>intLiteral [(“</a:t>
-              </a:r>
-              <a:r>
-                <a:rPr lang="en-US" sz="1800" dirty="0">
-                  <a:latin typeface="Consolas" pitchFamily="49" charset="0"/>
-                </a:rPr>
-                <a:t>100</a:t>
-              </a:r>
-              <a:r>
-                <a:rPr lang="en-US" sz="1800" dirty="0"/>
-                <a:t>”, (1, 10)]</a:t>
-              </a:r>
-            </a:p>
-          </p:txBody>
-        </p:sp>
-      </p:grpSp>
       <p:sp>
         <p:nvSpPr>
           <p:cNvPr id="10259" name="AutoShape 14"/>
@@ -9861,6 +9619,242 @@
           </a:ln>
         </p:spPr>
       </p:cxnSp>
+      <p:grpSp>
+        <p:nvGrpSpPr>
+          <p:cNvPr id="2" name="Group 1">
+            <a:extLst>
+              <a:ext uri="{FF2B5EF4-FFF2-40B4-BE49-F238E27FC236}">
+                <a16:creationId xmlns:a16="http://schemas.microsoft.com/office/drawing/2014/main" id="{C1988D5F-32AB-F77A-6325-0B148E67EF9D}"/>
+              </a:ext>
+            </a:extLst>
+          </p:cNvPr>
+          <p:cNvGrpSpPr/>
+          <p:nvPr/>
+        </p:nvGrpSpPr>
+        <p:grpSpPr>
+          <a:xfrm>
+            <a:off x="342900" y="5722410"/>
+            <a:ext cx="8458200" cy="339725"/>
+            <a:chOff x="304800" y="5334000"/>
+            <a:chExt cx="8458200" cy="339725"/>
+          </a:xfrm>
+        </p:grpSpPr>
+        <p:sp>
+          <p:nvSpPr>
+            <p:cNvPr id="3" name="Text Box 9">
+              <a:extLst>
+                <a:ext uri="{FF2B5EF4-FFF2-40B4-BE49-F238E27FC236}">
+                  <a16:creationId xmlns:a16="http://schemas.microsoft.com/office/drawing/2014/main" id="{1B656AB7-3954-282E-71A3-73D093842696}"/>
+                </a:ext>
+              </a:extLst>
+            </p:cNvPr>
+            <p:cNvSpPr txBox="1">
+              <a:spLocks noChangeArrowheads="1"/>
+            </p:cNvSpPr>
+            <p:nvPr/>
+          </p:nvSpPr>
+          <p:spPr bwMode="auto">
+            <a:xfrm>
+              <a:off x="304800" y="5334000"/>
+              <a:ext cx="2027238" cy="339725"/>
+            </a:xfrm>
+            <a:prstGeom prst="rect">
+              <a:avLst/>
+            </a:prstGeom>
+            <a:noFill/>
+            <a:ln w="9525">
+              <a:noFill/>
+              <a:miter lim="800000"/>
+              <a:headEnd/>
+              <a:tailEnd/>
+            </a:ln>
+          </p:spPr>
+          <p:txBody>
+            <a:bodyPr wrap="none" lIns="92075" tIns="46038" rIns="92075" bIns="46038">
+              <a:spAutoFit/>
+            </a:bodyPr>
+            <a:lstStyle/>
+            <a:p>
+              <a:r>
+                <a:rPr lang="en-US" sz="1600" dirty="0"/>
+                <a:t>identifier [“y”, (1, 1)]</a:t>
+              </a:r>
+            </a:p>
+          </p:txBody>
+        </p:sp>
+        <p:sp>
+          <p:nvSpPr>
+            <p:cNvPr id="4" name="Text Box 10">
+              <a:extLst>
+                <a:ext uri="{FF2B5EF4-FFF2-40B4-BE49-F238E27FC236}">
+                  <a16:creationId xmlns:a16="http://schemas.microsoft.com/office/drawing/2014/main" id="{14265CFF-C8F0-0C56-6314-1B40DF872BF9}"/>
+                </a:ext>
+              </a:extLst>
+            </p:cNvPr>
+            <p:cNvSpPr txBox="1">
+              <a:spLocks noChangeArrowheads="1"/>
+            </p:cNvSpPr>
+            <p:nvPr/>
+          </p:nvSpPr>
+          <p:spPr bwMode="auto">
+            <a:xfrm>
+              <a:off x="2397522" y="5334000"/>
+              <a:ext cx="1017588" cy="339725"/>
+            </a:xfrm>
+            <a:prstGeom prst="rect">
+              <a:avLst/>
+            </a:prstGeom>
+            <a:noFill/>
+            <a:ln w="9525">
+              <a:noFill/>
+              <a:miter lim="800000"/>
+              <a:headEnd/>
+              <a:tailEnd/>
+            </a:ln>
+          </p:spPr>
+          <p:txBody>
+            <a:bodyPr wrap="none" lIns="92075" tIns="46038" rIns="92075" bIns="46038">
+              <a:spAutoFit/>
+            </a:bodyPr>
+            <a:lstStyle/>
+            <a:p>
+              <a:r>
+                <a:rPr lang="en-US" sz="1600" dirty="0"/>
+                <a:t>:= [(1, 3)]</a:t>
+              </a:r>
+            </a:p>
+          </p:txBody>
+        </p:sp>
+        <p:sp>
+          <p:nvSpPr>
+            <p:cNvPr id="5" name="Text Box 11">
+              <a:extLst>
+                <a:ext uri="{FF2B5EF4-FFF2-40B4-BE49-F238E27FC236}">
+                  <a16:creationId xmlns:a16="http://schemas.microsoft.com/office/drawing/2014/main" id="{E0476A9C-FE6E-23B5-B478-3CCE30A59A30}"/>
+                </a:ext>
+              </a:extLst>
+            </p:cNvPr>
+            <p:cNvSpPr txBox="1">
+              <a:spLocks noChangeArrowheads="1"/>
+            </p:cNvSpPr>
+            <p:nvPr/>
+          </p:nvSpPr>
+          <p:spPr bwMode="auto">
+            <a:xfrm>
+              <a:off x="3480594" y="5334000"/>
+              <a:ext cx="2027238" cy="339725"/>
+            </a:xfrm>
+            <a:prstGeom prst="rect">
+              <a:avLst/>
+            </a:prstGeom>
+            <a:noFill/>
+            <a:ln w="9525">
+              <a:noFill/>
+              <a:miter lim="800000"/>
+              <a:headEnd/>
+              <a:tailEnd/>
+            </a:ln>
+          </p:spPr>
+          <p:txBody>
+            <a:bodyPr wrap="none" lIns="92075" tIns="46038" rIns="92075" bIns="46038">
+              <a:spAutoFit/>
+            </a:bodyPr>
+            <a:lstStyle/>
+            <a:p>
+              <a:r>
+                <a:rPr lang="en-US" sz="1600" dirty="0"/>
+                <a:t>identifier [“x”, (1, 6)]</a:t>
+              </a:r>
+            </a:p>
+          </p:txBody>
+        </p:sp>
+        <p:sp>
+          <p:nvSpPr>
+            <p:cNvPr id="6" name="Text Box 12">
+              <a:extLst>
+                <a:ext uri="{FF2B5EF4-FFF2-40B4-BE49-F238E27FC236}">
+                  <a16:creationId xmlns:a16="http://schemas.microsoft.com/office/drawing/2014/main" id="{1BF32031-C1D8-2DD1-9C2F-7BDB15DB1321}"/>
+                </a:ext>
+              </a:extLst>
+            </p:cNvPr>
+            <p:cNvSpPr txBox="1">
+              <a:spLocks noChangeArrowheads="1"/>
+            </p:cNvSpPr>
+            <p:nvPr/>
+          </p:nvSpPr>
+          <p:spPr bwMode="auto">
+            <a:xfrm>
+              <a:off x="5573316" y="5334000"/>
+              <a:ext cx="960438" cy="339725"/>
+            </a:xfrm>
+            <a:prstGeom prst="rect">
+              <a:avLst/>
+            </a:prstGeom>
+            <a:noFill/>
+            <a:ln w="9525">
+              <a:noFill/>
+              <a:miter lim="800000"/>
+              <a:headEnd/>
+              <a:tailEnd/>
+            </a:ln>
+          </p:spPr>
+          <p:txBody>
+            <a:bodyPr wrap="none" lIns="92075" tIns="46038" rIns="92075" bIns="46038">
+              <a:spAutoFit/>
+            </a:bodyPr>
+            <a:lstStyle/>
+            <a:p>
+              <a:r>
+                <a:rPr lang="en-US" sz="1600" dirty="0"/>
+                <a:t>+ [(1, 8)]</a:t>
+              </a:r>
+            </a:p>
+          </p:txBody>
+        </p:sp>
+        <p:sp>
+          <p:nvSpPr>
+            <p:cNvPr id="8" name="Text Box 13">
+              <a:extLst>
+                <a:ext uri="{FF2B5EF4-FFF2-40B4-BE49-F238E27FC236}">
+                  <a16:creationId xmlns:a16="http://schemas.microsoft.com/office/drawing/2014/main" id="{A39AB0C6-143B-A64F-9984-5C14C8C1B902}"/>
+                </a:ext>
+              </a:extLst>
+            </p:cNvPr>
+            <p:cNvSpPr txBox="1">
+              <a:spLocks noChangeArrowheads="1"/>
+            </p:cNvSpPr>
+            <p:nvPr/>
+          </p:nvSpPr>
+          <p:spPr bwMode="auto">
+            <a:xfrm>
+              <a:off x="6599237" y="5334000"/>
+              <a:ext cx="2163763" cy="339725"/>
+            </a:xfrm>
+            <a:prstGeom prst="rect">
+              <a:avLst/>
+            </a:prstGeom>
+            <a:noFill/>
+            <a:ln w="9525">
+              <a:noFill/>
+              <a:miter lim="800000"/>
+              <a:headEnd/>
+              <a:tailEnd/>
+            </a:ln>
+          </p:spPr>
+          <p:txBody>
+            <a:bodyPr wrap="none" lIns="92075" tIns="46038" rIns="92075" bIns="46038">
+              <a:spAutoFit/>
+            </a:bodyPr>
+            <a:lstStyle/>
+            <a:p>
+              <a:r>
+                <a:rPr lang="en-US" sz="1600" dirty="0"/>
+                <a:t>intLiteral [(“1”, (1, 10)]</a:t>
+              </a:r>
+            </a:p>
+          </p:txBody>
+        </p:sp>
+      </p:grpSp>
     </p:spTree>
   </p:cSld>
   <p:clrMapOvr>

</xml_diff>

<commit_message>
correction to one slide
</commit_message>
<xml_diff>
--- a/PowerPoints/05 - Lexical Analysis.pptx
+++ b/PowerPoints/05 - Lexical Analysis.pptx
@@ -1,6 +1,6 @@
 
 <file path=ppt/presentation.xml><?xml version="1.0" encoding="utf-8"?>
-<p:presentation xmlns:a="http://schemas.openxmlformats.org/drawingml/2006/main" xmlns:r="http://schemas.openxmlformats.org/officeDocument/2006/relationships" xmlns:p="http://schemas.openxmlformats.org/presentationml/2006/main" saveSubsetFonts="1">
+<p:presentation xmlns:a="http://schemas.openxmlformats.org/drawingml/2006/main" xmlns:r="http://schemas.openxmlformats.org/officeDocument/2006/relationships" xmlns:p="http://schemas.openxmlformats.org/presentationml/2006/main" saveSubsetFonts="1" autoCompressPictures="0">
   <p:sldMasterIdLst>
     <p:sldMasterId id="2147483651" r:id="rId1"/>
   </p:sldMasterIdLst>
@@ -43,7 +43,7 @@
     <p:sldId id="272" r:id="rId31"/>
     <p:sldId id="274" r:id="rId32"/>
     <p:sldId id="286" r:id="rId33"/>
-    <p:sldId id="358" r:id="rId34"/>
+    <p:sldId id="360" r:id="rId34"/>
     <p:sldId id="287" r:id="rId35"/>
     <p:sldId id="359" r:id="rId36"/>
     <p:sldId id="282" r:id="rId37"/>
@@ -6825,21 +6825,11 @@
               <a:rPr lang="en-US" dirty="0">
                 <a:latin typeface="Consolas" panose="020B0609020204030204" pitchFamily="49" charset="0"/>
               </a:rPr>
-              <a:t>Hello, </a:t>
-            </a:r>
-            <a:r>
-              <a:rPr lang="en-US">
-                <a:latin typeface="Consolas" panose="020B0609020204030204" pitchFamily="49" charset="0"/>
-              </a:rPr>
-              <a:t>world.</a:t>
-            </a:r>
-            <a:r>
-              <a:rPr lang="en-US"/>
-              <a:t>"” </a:t>
+              <a:t>Hello, world.</a:t>
             </a:r>
             <a:r>
               <a:rPr lang="en-US" dirty="0"/>
-              <a:t>for a string literal</a:t>
+              <a:t>"” for a string literal</a:t>
             </a:r>
           </a:p>
           <a:p>
@@ -9624,7 +9614,7 @@
           <p:cNvPr id="2" name="Group 1">
             <a:extLst>
               <a:ext uri="{FF2B5EF4-FFF2-40B4-BE49-F238E27FC236}">
-                <a16:creationId xmlns:a16="http://schemas.microsoft.com/office/drawing/2014/main" id="{C1988D5F-32AB-F77A-6325-0B148E67EF9D}"/>
+                <a16:creationId xmlns:a16="http://schemas.microsoft.com/office/drawing/2014/main" id="{67768ACC-CA6E-8C95-9A0B-638AAF740362}"/>
               </a:ext>
             </a:extLst>
           </p:cNvPr>
@@ -9633,10 +9623,10 @@
         </p:nvGrpSpPr>
         <p:grpSpPr>
           <a:xfrm>
-            <a:off x="342900" y="5722410"/>
-            <a:ext cx="8458200" cy="339725"/>
+            <a:off x="342900" y="5715000"/>
+            <a:ext cx="8572160" cy="339725"/>
             <a:chOff x="304800" y="5334000"/>
-            <a:chExt cx="8458200" cy="339725"/>
+            <a:chExt cx="8572160" cy="339725"/>
           </a:xfrm>
         </p:grpSpPr>
         <p:sp>
@@ -9644,7 +9634,7 @@
             <p:cNvPr id="3" name="Text Box 9">
               <a:extLst>
                 <a:ext uri="{FF2B5EF4-FFF2-40B4-BE49-F238E27FC236}">
-                  <a16:creationId xmlns:a16="http://schemas.microsoft.com/office/drawing/2014/main" id="{1B656AB7-3954-282E-71A3-73D093842696}"/>
+                  <a16:creationId xmlns:a16="http://schemas.microsoft.com/office/drawing/2014/main" id="{189D8FEF-1808-A3D1-BB99-4B65DC12439E}"/>
                 </a:ext>
               </a:extLst>
             </p:cNvPr>
@@ -9687,7 +9677,7 @@
             <p:cNvPr id="4" name="Text Box 10">
               <a:extLst>
                 <a:ext uri="{FF2B5EF4-FFF2-40B4-BE49-F238E27FC236}">
-                  <a16:creationId xmlns:a16="http://schemas.microsoft.com/office/drawing/2014/main" id="{14265CFF-C8F0-0C56-6314-1B40DF872BF9}"/>
+                  <a16:creationId xmlns:a16="http://schemas.microsoft.com/office/drawing/2014/main" id="{B266166A-D314-CBC4-2C07-D983570C8A80}"/>
                 </a:ext>
               </a:extLst>
             </p:cNvPr>
@@ -9698,7 +9688,7 @@
           </p:nvSpPr>
           <p:spPr bwMode="auto">
             <a:xfrm>
-              <a:off x="2397522" y="5334000"/>
+              <a:off x="2369032" y="5334000"/>
               <a:ext cx="1017588" cy="339725"/>
             </a:xfrm>
             <a:prstGeom prst="rect">
@@ -9730,7 +9720,7 @@
             <p:cNvPr id="5" name="Text Box 11">
               <a:extLst>
                 <a:ext uri="{FF2B5EF4-FFF2-40B4-BE49-F238E27FC236}">
-                  <a16:creationId xmlns:a16="http://schemas.microsoft.com/office/drawing/2014/main" id="{E0476A9C-FE6E-23B5-B478-3CCE30A59A30}"/>
+                  <a16:creationId xmlns:a16="http://schemas.microsoft.com/office/drawing/2014/main" id="{15BF4520-93A3-CE74-9856-4BDE80D6F941}"/>
                 </a:ext>
               </a:extLst>
             </p:cNvPr>
@@ -9741,7 +9731,7 @@
           </p:nvSpPr>
           <p:spPr bwMode="auto">
             <a:xfrm>
-              <a:off x="3480594" y="5334000"/>
+              <a:off x="3423614" y="5334000"/>
               <a:ext cx="2027238" cy="339725"/>
             </a:xfrm>
             <a:prstGeom prst="rect">
@@ -9773,7 +9763,7 @@
             <p:cNvPr id="6" name="Text Box 12">
               <a:extLst>
                 <a:ext uri="{FF2B5EF4-FFF2-40B4-BE49-F238E27FC236}">
-                  <a16:creationId xmlns:a16="http://schemas.microsoft.com/office/drawing/2014/main" id="{1BF32031-C1D8-2DD1-9C2F-7BDB15DB1321}"/>
+                  <a16:creationId xmlns:a16="http://schemas.microsoft.com/office/drawing/2014/main" id="{83E4FF80-960C-D0EF-F3EE-7C89800FDDC3}"/>
                 </a:ext>
               </a:extLst>
             </p:cNvPr>
@@ -9784,7 +9774,7 @@
           </p:nvSpPr>
           <p:spPr bwMode="auto">
             <a:xfrm>
-              <a:off x="5573316" y="5334000"/>
+              <a:off x="5487846" y="5334000"/>
               <a:ext cx="960438" cy="339725"/>
             </a:xfrm>
             <a:prstGeom prst="rect">
@@ -9816,7 +9806,7 @@
             <p:cNvPr id="8" name="Text Box 13">
               <a:extLst>
                 <a:ext uri="{FF2B5EF4-FFF2-40B4-BE49-F238E27FC236}">
-                  <a16:creationId xmlns:a16="http://schemas.microsoft.com/office/drawing/2014/main" id="{A39AB0C6-143B-A64F-9984-5C14C8C1B902}"/>
+                  <a16:creationId xmlns:a16="http://schemas.microsoft.com/office/drawing/2014/main" id="{3C9975FC-F827-0CE3-4BD1-CD6DA238E566}"/>
                 </a:ext>
               </a:extLst>
             </p:cNvPr>
@@ -9827,8 +9817,8 @@
           </p:nvSpPr>
           <p:spPr bwMode="auto">
             <a:xfrm>
-              <a:off x="6599237" y="5334000"/>
-              <a:ext cx="2163763" cy="339725"/>
+              <a:off x="6485279" y="5334000"/>
+              <a:ext cx="2391681" cy="339196"/>
             </a:xfrm>
             <a:prstGeom prst="rect">
               <a:avLst/>
@@ -9849,7 +9839,7 @@
             <a:p>
               <a:r>
                 <a:rPr lang="en-US" sz="1600" dirty="0"/>
-                <a:t>intLiteral [(“1”, (1, 10)]</a:t>
+                <a:t>intLiteral [(“100”, (1, 10)]</a:t>
               </a:r>
             </a:p>
           </p:txBody>
@@ -11279,7 +11269,11 @@
           <a:p>
             <a:r>
               <a:rPr lang="en-US" sz="2300" dirty="0"/>
-              <a:t>Most parsing decisions can be made by using the symbol returned from method </a:t>
+              <a:t>Most parsing decisions can be made by using the symbol </a:t>
+            </a:r>
+            <a:r>
+              <a:rPr lang="en-US" sz="2300"/>
+              <a:t>returned from method </a:t>
             </a:r>
             <a:r>
               <a:rPr lang="en-US" sz="2300" dirty="0" err="1">
@@ -15192,7 +15186,7 @@
     </p:spTree>
     <p:extLst>
       <p:ext uri="{BB962C8B-B14F-4D97-AF65-F5344CB8AC3E}">
-        <p14:creationId xmlns:p14="http://schemas.microsoft.com/office/powerpoint/2010/main" val="596551521"/>
+        <p14:creationId xmlns:p14="http://schemas.microsoft.com/office/powerpoint/2010/main" val="2149727484"/>
       </p:ext>
     </p:extLst>
   </p:cSld>
@@ -18038,7 +18032,7 @@
               <a:rPr lang="en-US" sz="1800" dirty="0">
                 <a:latin typeface="Consolas" pitchFamily="49" charset="0"/>
               </a:rPr>
-              <a:t>var reader   = new </a:t>
+              <a:t>var reader = new </a:t>
             </a:r>
             <a:r>
               <a:rPr lang="en-US" sz="1800" dirty="0" err="1">
@@ -18077,7 +18071,7 @@
               <a:rPr lang="en-US" sz="1800" dirty="0">
                 <a:latin typeface="Consolas" pitchFamily="49" charset="0"/>
               </a:rPr>
-              <a:t>var source   = new Source(reader);</a:t>
+              <a:t>var source = new Source(reader);</a:t>
             </a:r>
           </a:p>
           <a:p>
@@ -18092,7 +18086,7 @@
               <a:rPr lang="en-US" sz="1800" dirty="0">
                 <a:latin typeface="Consolas" pitchFamily="49" charset="0"/>
               </a:rPr>
-              <a:t>var out      = new </a:t>
+              <a:t>var out    = new </a:t>
             </a:r>
             <a:r>
               <a:rPr lang="en-US" sz="1800" dirty="0" err="1">
@@ -18131,7 +18125,7 @@
               <a:rPr lang="en-US" sz="1800" dirty="0">
                 <a:latin typeface="Consolas" pitchFamily="49" charset="0"/>
               </a:rPr>
-              <a:t>                               StandardCharsets.UTF_8);</a:t>
+              <a:t>                             StandardCharsets.UTF_8);</a:t>
             </a:r>
           </a:p>
           <a:p>

</xml_diff>